<commit_message>
Update SemesterB Marathon Presentation.pptx
</commit_message>
<xml_diff>
--- a/Documents/SemesterB Marathon Presentation.pptx
+++ b/Documents/SemesterB Marathon Presentation.pptx
@@ -9240,7 +9240,7 @@
           <a:p>
             <a:fld id="{EFBA5EAA-4DAB-45C1-9CCB-89B72C47B331}" type="datetimeFigureOut">
               <a:rPr lang="en-US" smtClean="0"/>
-              <a:t>4/21/2023</a:t>
+              <a:t>4/23/2023</a:t>
             </a:fld>
             <a:endParaRPr lang="en-US"/>
           </a:p>
@@ -9536,7 +9536,7 @@
           <a:p>
             <a:fld id="{EFBA5EAA-4DAB-45C1-9CCB-89B72C47B331}" type="datetimeFigureOut">
               <a:rPr lang="en-US" smtClean="0"/>
-              <a:t>4/21/2023</a:t>
+              <a:t>4/23/2023</a:t>
             </a:fld>
             <a:endParaRPr lang="en-US"/>
           </a:p>
@@ -9784,7 +9784,7 @@
           <a:p>
             <a:fld id="{EFBA5EAA-4DAB-45C1-9CCB-89B72C47B331}" type="datetimeFigureOut">
               <a:rPr lang="en-US" smtClean="0"/>
-              <a:t>4/21/2023</a:t>
+              <a:t>4/23/2023</a:t>
             </a:fld>
             <a:endParaRPr lang="en-US"/>
           </a:p>
@@ -10324,7 +10324,7 @@
           <a:p>
             <a:fld id="{EFBA5EAA-4DAB-45C1-9CCB-89B72C47B331}" type="datetimeFigureOut">
               <a:rPr lang="en-US" smtClean="0"/>
-              <a:t>4/21/2023</a:t>
+              <a:t>4/23/2023</a:t>
             </a:fld>
             <a:endParaRPr lang="en-US"/>
           </a:p>
@@ -10572,7 +10572,7 @@
           <a:p>
             <a:fld id="{EFBA5EAA-4DAB-45C1-9CCB-89B72C47B331}" type="datetimeFigureOut">
               <a:rPr lang="en-US" smtClean="0"/>
-              <a:t>4/21/2023</a:t>
+              <a:t>4/23/2023</a:t>
             </a:fld>
             <a:endParaRPr lang="en-US"/>
           </a:p>
@@ -11104,7 +11104,7 @@
           <a:p>
             <a:fld id="{EFBA5EAA-4DAB-45C1-9CCB-89B72C47B331}" type="datetimeFigureOut">
               <a:rPr lang="en-US" smtClean="0"/>
-              <a:t>4/21/2023</a:t>
+              <a:t>4/23/2023</a:t>
             </a:fld>
             <a:endParaRPr lang="en-US"/>
           </a:p>
@@ -11401,7 +11401,7 @@
           <a:p>
             <a:fld id="{EFBA5EAA-4DAB-45C1-9CCB-89B72C47B331}" type="datetimeFigureOut">
               <a:rPr lang="en-US" smtClean="0"/>
-              <a:t>4/21/2023</a:t>
+              <a:t>4/23/2023</a:t>
             </a:fld>
             <a:endParaRPr lang="en-US"/>
           </a:p>
@@ -11575,7 +11575,7 @@
           <a:p>
             <a:fld id="{EFBA5EAA-4DAB-45C1-9CCB-89B72C47B331}" type="datetimeFigureOut">
               <a:rPr lang="en-US" smtClean="0"/>
-              <a:t>4/21/2023</a:t>
+              <a:t>4/23/2023</a:t>
             </a:fld>
             <a:endParaRPr lang="en-US"/>
           </a:p>
@@ -11755,7 +11755,7 @@
           <a:p>
             <a:fld id="{EFBA5EAA-4DAB-45C1-9CCB-89B72C47B331}" type="datetimeFigureOut">
               <a:rPr lang="en-US" smtClean="0"/>
-              <a:t>4/21/2023</a:t>
+              <a:t>4/23/2023</a:t>
             </a:fld>
             <a:endParaRPr lang="en-US"/>
           </a:p>
@@ -11925,7 +11925,7 @@
           <a:p>
             <a:fld id="{EFBA5EAA-4DAB-45C1-9CCB-89B72C47B331}" type="datetimeFigureOut">
               <a:rPr lang="en-US" smtClean="0"/>
-              <a:t>4/21/2023</a:t>
+              <a:t>4/23/2023</a:t>
             </a:fld>
             <a:endParaRPr lang="en-US"/>
           </a:p>
@@ -12176,7 +12176,7 @@
           <a:p>
             <a:fld id="{EFBA5EAA-4DAB-45C1-9CCB-89B72C47B331}" type="datetimeFigureOut">
               <a:rPr lang="en-US" smtClean="0"/>
-              <a:t>4/21/2023</a:t>
+              <a:t>4/23/2023</a:t>
             </a:fld>
             <a:endParaRPr lang="en-US"/>
           </a:p>
@@ -12473,7 +12473,7 @@
           <a:p>
             <a:fld id="{EFBA5EAA-4DAB-45C1-9CCB-89B72C47B331}" type="datetimeFigureOut">
               <a:rPr lang="en-US" smtClean="0"/>
-              <a:t>4/21/2023</a:t>
+              <a:t>4/23/2023</a:t>
             </a:fld>
             <a:endParaRPr lang="en-US"/>
           </a:p>
@@ -12915,7 +12915,7 @@
           <a:p>
             <a:fld id="{EFBA5EAA-4DAB-45C1-9CCB-89B72C47B331}" type="datetimeFigureOut">
               <a:rPr lang="en-US" smtClean="0"/>
-              <a:t>4/21/2023</a:t>
+              <a:t>4/23/2023</a:t>
             </a:fld>
             <a:endParaRPr lang="en-US"/>
           </a:p>
@@ -13033,7 +13033,7 @@
           <a:p>
             <a:fld id="{EFBA5EAA-4DAB-45C1-9CCB-89B72C47B331}" type="datetimeFigureOut">
               <a:rPr lang="en-US" smtClean="0"/>
-              <a:t>4/21/2023</a:t>
+              <a:t>4/23/2023</a:t>
             </a:fld>
             <a:endParaRPr lang="en-US"/>
           </a:p>
@@ -13128,7 +13128,7 @@
           <a:p>
             <a:fld id="{EFBA5EAA-4DAB-45C1-9CCB-89B72C47B331}" type="datetimeFigureOut">
               <a:rPr lang="en-US" smtClean="0"/>
-              <a:t>4/21/2023</a:t>
+              <a:t>4/23/2023</a:t>
             </a:fld>
             <a:endParaRPr lang="en-US"/>
           </a:p>
@@ -13411,7 +13411,7 @@
           <a:p>
             <a:fld id="{EFBA5EAA-4DAB-45C1-9CCB-89B72C47B331}" type="datetimeFigureOut">
               <a:rPr lang="en-US" smtClean="0"/>
-              <a:t>4/21/2023</a:t>
+              <a:t>4/23/2023</a:t>
             </a:fld>
             <a:endParaRPr lang="en-US"/>
           </a:p>
@@ -13702,7 +13702,7 @@
           <a:p>
             <a:fld id="{EFBA5EAA-4DAB-45C1-9CCB-89B72C47B331}" type="datetimeFigureOut">
               <a:rPr lang="en-US" smtClean="0"/>
-              <a:t>4/21/2023</a:t>
+              <a:t>4/23/2023</a:t>
             </a:fld>
             <a:endParaRPr lang="en-US"/>
           </a:p>
@@ -14232,7 +14232,7 @@
           <a:p>
             <a:fld id="{EFBA5EAA-4DAB-45C1-9CCB-89B72C47B331}" type="datetimeFigureOut">
               <a:rPr lang="en-US" smtClean="0"/>
-              <a:t>4/21/2023</a:t>
+              <a:t>4/23/2023</a:t>
             </a:fld>
             <a:endParaRPr lang="en-US"/>
           </a:p>
@@ -15879,22 +15879,23 @@
   <p:cSld>
     <p:bg>
       <p:bgPr>
-        <a:blipFill rotWithShape="1">
-          <a:blip r:embed="rId2">
-            <a:duotone>
+        <a:gradFill rotWithShape="1">
+          <a:gsLst>
+            <a:gs pos="0">
               <a:schemeClr val="bg2">
-                <a:shade val="76000"/>
-                <a:satMod val="180000"/>
+                <a:tint val="90000"/>
+                <a:lumMod val="110000"/>
               </a:schemeClr>
+            </a:gs>
+            <a:gs pos="100000">
               <a:schemeClr val="bg2">
-                <a:tint val="80000"/>
-                <a:satMod val="120000"/>
-                <a:lumMod val="180000"/>
+                <a:shade val="64000"/>
+                <a:lumMod val="98000"/>
               </a:schemeClr>
-            </a:duotone>
-          </a:blip>
-          <a:stretch/>
-        </a:blipFill>
+            </a:gs>
+          </a:gsLst>
+          <a:lin ang="5400000" scaled="0"/>
+        </a:gradFill>
         <a:effectLst/>
       </p:bgPr>
     </p:bg>
@@ -15912,6 +15913,429 @@
           <a:chExt cx="0" cy="0"/>
         </a:xfrm>
       </p:grpSpPr>
+      <p:grpSp>
+        <p:nvGrpSpPr>
+          <p:cNvPr id="13" name="Group 12">
+            <a:extLst>
+              <a:ext uri="{FF2B5EF4-FFF2-40B4-BE49-F238E27FC236}">
+                <a16:creationId xmlns:a16="http://schemas.microsoft.com/office/drawing/2014/main" id="{71092D16-14DA-4606-831F-0DB3EEECB91C}"/>
+              </a:ext>
+              <a:ext uri="{C183D7F6-B498-43B3-948B-1728B52AA6E4}">
+                <adec:decorative xmlns:adec="http://schemas.microsoft.com/office/drawing/2017/decorative" val="1"/>
+              </a:ext>
+            </a:extLst>
+          </p:cNvPr>
+          <p:cNvGrpSpPr>
+            <a:grpSpLocks noGrp="1" noUngrp="1" noRot="1" noChangeAspect="1" noMove="1" noResize="1"/>
+          </p:cNvGrpSpPr>
+          <p:nvPr>
+            <p:extLst>
+              <p:ext uri="{386F3935-93C4-4BCD-93E2-E3B085C9AB24}">
+                <p16:designElem xmlns:p16="http://schemas.microsoft.com/office/powerpoint/2015/main" val="1"/>
+              </p:ext>
+            </p:extLst>
+          </p:nvPr>
+        </p:nvGrpSpPr>
+        <p:grpSpPr>
+          <a:xfrm>
+            <a:off x="150812" y="0"/>
+            <a:ext cx="2436813" cy="6858001"/>
+            <a:chOff x="1320800" y="0"/>
+            <a:chExt cx="2436813" cy="6858001"/>
+          </a:xfrm>
+        </p:grpSpPr>
+        <p:sp>
+          <p:nvSpPr>
+            <p:cNvPr id="14" name="Freeform 6">
+              <a:extLst>
+                <a:ext uri="{FF2B5EF4-FFF2-40B4-BE49-F238E27FC236}">
+                  <a16:creationId xmlns:a16="http://schemas.microsoft.com/office/drawing/2014/main" id="{81806E72-5EFD-4407-B492-2EBC71FF5EDB}"/>
+                </a:ext>
+                <a:ext uri="{C183D7F6-B498-43B3-948B-1728B52AA6E4}">
+                  <adec:decorative xmlns:adec="http://schemas.microsoft.com/office/drawing/2017/decorative" val="1"/>
+                </a:ext>
+              </a:extLst>
+            </p:cNvPr>
+            <p:cNvSpPr/>
+            <p:nvPr>
+              <p:extLst>
+                <p:ext uri="{386F3935-93C4-4BCD-93E2-E3B085C9AB24}">
+                  <p16:designElem xmlns:p16="http://schemas.microsoft.com/office/powerpoint/2015/main" val="1"/>
+                </p:ext>
+              </p:extLst>
+            </p:nvPr>
+          </p:nvSpPr>
+          <p:spPr bwMode="auto">
+            <a:xfrm>
+              <a:off x="1627188" y="0"/>
+              <a:ext cx="1122363" cy="5329238"/>
+            </a:xfrm>
+            <a:custGeom>
+              <a:avLst/>
+              <a:gdLst/>
+              <a:ahLst/>
+              <a:cxnLst/>
+              <a:rect l="0" t="0" r="r" b="b"/>
+              <a:pathLst>
+                <a:path w="707" h="3357">
+                  <a:moveTo>
+                    <a:pt x="0" y="3330"/>
+                  </a:moveTo>
+                  <a:lnTo>
+                    <a:pt x="156" y="3357"/>
+                  </a:lnTo>
+                  <a:lnTo>
+                    <a:pt x="707" y="0"/>
+                  </a:lnTo>
+                  <a:lnTo>
+                    <a:pt x="547" y="0"/>
+                  </a:lnTo>
+                  <a:lnTo>
+                    <a:pt x="0" y="3330"/>
+                  </a:lnTo>
+                  <a:close/>
+                </a:path>
+              </a:pathLst>
+            </a:custGeom>
+            <a:solidFill>
+              <a:schemeClr val="accent1"/>
+            </a:solidFill>
+            <a:ln>
+              <a:noFill/>
+            </a:ln>
+          </p:spPr>
+        </p:sp>
+        <p:sp>
+          <p:nvSpPr>
+            <p:cNvPr id="15" name="Freeform 7">
+              <a:extLst>
+                <a:ext uri="{FF2B5EF4-FFF2-40B4-BE49-F238E27FC236}">
+                  <a16:creationId xmlns:a16="http://schemas.microsoft.com/office/drawing/2014/main" id="{BA81CA3B-9A2E-4F71-BF99-2C58BA76C2D6}"/>
+                </a:ext>
+                <a:ext uri="{C183D7F6-B498-43B3-948B-1728B52AA6E4}">
+                  <adec:decorative xmlns:adec="http://schemas.microsoft.com/office/drawing/2017/decorative" val="1"/>
+                </a:ext>
+              </a:extLst>
+            </p:cNvPr>
+            <p:cNvSpPr/>
+            <p:nvPr>
+              <p:extLst>
+                <p:ext uri="{386F3935-93C4-4BCD-93E2-E3B085C9AB24}">
+                  <p16:designElem xmlns:p16="http://schemas.microsoft.com/office/powerpoint/2015/main" val="1"/>
+                </p:ext>
+              </p:extLst>
+            </p:nvPr>
+          </p:nvSpPr>
+          <p:spPr bwMode="auto">
+            <a:xfrm>
+              <a:off x="1320800" y="0"/>
+              <a:ext cx="1117600" cy="5276850"/>
+            </a:xfrm>
+            <a:custGeom>
+              <a:avLst/>
+              <a:gdLst/>
+              <a:ahLst/>
+              <a:cxnLst/>
+              <a:rect l="0" t="0" r="r" b="b"/>
+              <a:pathLst>
+                <a:path w="704" h="3324">
+                  <a:moveTo>
+                    <a:pt x="704" y="0"/>
+                  </a:moveTo>
+                  <a:lnTo>
+                    <a:pt x="545" y="0"/>
+                  </a:lnTo>
+                  <a:lnTo>
+                    <a:pt x="0" y="3300"/>
+                  </a:lnTo>
+                  <a:lnTo>
+                    <a:pt x="157" y="3324"/>
+                  </a:lnTo>
+                  <a:lnTo>
+                    <a:pt x="704" y="0"/>
+                  </a:lnTo>
+                  <a:close/>
+                </a:path>
+              </a:pathLst>
+            </a:custGeom>
+            <a:solidFill>
+              <a:schemeClr val="tx1">
+                <a:lumMod val="65000"/>
+                <a:lumOff val="35000"/>
+              </a:schemeClr>
+            </a:solidFill>
+            <a:ln>
+              <a:noFill/>
+            </a:ln>
+          </p:spPr>
+        </p:sp>
+        <p:sp>
+          <p:nvSpPr>
+            <p:cNvPr id="16" name="Freeform 8">
+              <a:extLst>
+                <a:ext uri="{FF2B5EF4-FFF2-40B4-BE49-F238E27FC236}">
+                  <a16:creationId xmlns:a16="http://schemas.microsoft.com/office/drawing/2014/main" id="{D00EF4F3-D70F-44D5-A71C-69C3FA0D28D6}"/>
+                </a:ext>
+                <a:ext uri="{C183D7F6-B498-43B3-948B-1728B52AA6E4}">
+                  <adec:decorative xmlns:adec="http://schemas.microsoft.com/office/drawing/2017/decorative" val="1"/>
+                </a:ext>
+              </a:extLst>
+            </p:cNvPr>
+            <p:cNvSpPr/>
+            <p:nvPr>
+              <p:extLst>
+                <p:ext uri="{386F3935-93C4-4BCD-93E2-E3B085C9AB24}">
+                  <p16:designElem xmlns:p16="http://schemas.microsoft.com/office/powerpoint/2015/main" val="1"/>
+                </p:ext>
+              </p:extLst>
+            </p:nvPr>
+          </p:nvSpPr>
+          <p:spPr bwMode="auto">
+            <a:xfrm>
+              <a:off x="1320800" y="5238750"/>
+              <a:ext cx="1228725" cy="1619250"/>
+            </a:xfrm>
+            <a:custGeom>
+              <a:avLst/>
+              <a:gdLst/>
+              <a:ahLst/>
+              <a:cxnLst/>
+              <a:rect l="0" t="0" r="r" b="b"/>
+              <a:pathLst>
+                <a:path w="774" h="1020">
+                  <a:moveTo>
+                    <a:pt x="0" y="0"/>
+                  </a:moveTo>
+                  <a:lnTo>
+                    <a:pt x="740" y="1020"/>
+                  </a:lnTo>
+                  <a:lnTo>
+                    <a:pt x="774" y="1020"/>
+                  </a:lnTo>
+                  <a:lnTo>
+                    <a:pt x="0" y="0"/>
+                  </a:lnTo>
+                  <a:close/>
+                </a:path>
+              </a:pathLst>
+            </a:custGeom>
+            <a:solidFill>
+              <a:schemeClr val="tx1">
+                <a:lumMod val="85000"/>
+                <a:lumOff val="15000"/>
+              </a:schemeClr>
+            </a:solidFill>
+            <a:ln>
+              <a:noFill/>
+            </a:ln>
+          </p:spPr>
+        </p:sp>
+        <p:sp>
+          <p:nvSpPr>
+            <p:cNvPr id="17" name="Freeform 9">
+              <a:extLst>
+                <a:ext uri="{FF2B5EF4-FFF2-40B4-BE49-F238E27FC236}">
+                  <a16:creationId xmlns:a16="http://schemas.microsoft.com/office/drawing/2014/main" id="{2CC930FA-FD42-4EF1-A9AB-0F9C302383FE}"/>
+                </a:ext>
+                <a:ext uri="{C183D7F6-B498-43B3-948B-1728B52AA6E4}">
+                  <adec:decorative xmlns:adec="http://schemas.microsoft.com/office/drawing/2017/decorative" val="1"/>
+                </a:ext>
+              </a:extLst>
+            </p:cNvPr>
+            <p:cNvSpPr/>
+            <p:nvPr>
+              <p:extLst>
+                <p:ext uri="{386F3935-93C4-4BCD-93E2-E3B085C9AB24}">
+                  <p16:designElem xmlns:p16="http://schemas.microsoft.com/office/powerpoint/2015/main" val="1"/>
+                </p:ext>
+              </p:extLst>
+            </p:nvPr>
+          </p:nvSpPr>
+          <p:spPr bwMode="auto">
+            <a:xfrm>
+              <a:off x="1627188" y="5291138"/>
+              <a:ext cx="1495425" cy="1566863"/>
+            </a:xfrm>
+            <a:custGeom>
+              <a:avLst/>
+              <a:gdLst/>
+              <a:ahLst/>
+              <a:cxnLst/>
+              <a:rect l="0" t="0" r="r" b="b"/>
+              <a:pathLst>
+                <a:path w="942" h="987">
+                  <a:moveTo>
+                    <a:pt x="0" y="0"/>
+                  </a:moveTo>
+                  <a:lnTo>
+                    <a:pt x="909" y="987"/>
+                  </a:lnTo>
+                  <a:lnTo>
+                    <a:pt x="942" y="987"/>
+                  </a:lnTo>
+                  <a:lnTo>
+                    <a:pt x="0" y="0"/>
+                  </a:lnTo>
+                  <a:close/>
+                </a:path>
+              </a:pathLst>
+            </a:custGeom>
+            <a:solidFill>
+              <a:schemeClr val="accent1">
+                <a:lumMod val="50000"/>
+              </a:schemeClr>
+            </a:solidFill>
+            <a:ln>
+              <a:noFill/>
+            </a:ln>
+          </p:spPr>
+        </p:sp>
+        <p:sp>
+          <p:nvSpPr>
+            <p:cNvPr id="18" name="Freeform 10">
+              <a:extLst>
+                <a:ext uri="{FF2B5EF4-FFF2-40B4-BE49-F238E27FC236}">
+                  <a16:creationId xmlns:a16="http://schemas.microsoft.com/office/drawing/2014/main" id="{F18F276C-D13F-46CF-9880-2050C2DBF917}"/>
+                </a:ext>
+                <a:ext uri="{C183D7F6-B498-43B3-948B-1728B52AA6E4}">
+                  <adec:decorative xmlns:adec="http://schemas.microsoft.com/office/drawing/2017/decorative" val="1"/>
+                </a:ext>
+              </a:extLst>
+            </p:cNvPr>
+            <p:cNvSpPr/>
+            <p:nvPr>
+              <p:extLst>
+                <p:ext uri="{386F3935-93C4-4BCD-93E2-E3B085C9AB24}">
+                  <p16:designElem xmlns:p16="http://schemas.microsoft.com/office/powerpoint/2015/main" val="1"/>
+                </p:ext>
+              </p:extLst>
+            </p:nvPr>
+          </p:nvSpPr>
+          <p:spPr bwMode="auto">
+            <a:xfrm>
+              <a:off x="1627188" y="5286375"/>
+              <a:ext cx="2130425" cy="1571625"/>
+            </a:xfrm>
+            <a:custGeom>
+              <a:avLst/>
+              <a:gdLst/>
+              <a:ahLst/>
+              <a:cxnLst/>
+              <a:rect l="0" t="0" r="r" b="b"/>
+              <a:pathLst>
+                <a:path w="1342" h="990">
+                  <a:moveTo>
+                    <a:pt x="0" y="3"/>
+                  </a:moveTo>
+                  <a:lnTo>
+                    <a:pt x="942" y="990"/>
+                  </a:lnTo>
+                  <a:lnTo>
+                    <a:pt x="1342" y="990"/>
+                  </a:lnTo>
+                  <a:lnTo>
+                    <a:pt x="156" y="27"/>
+                  </a:lnTo>
+                  <a:lnTo>
+                    <a:pt x="0" y="0"/>
+                  </a:lnTo>
+                  <a:lnTo>
+                    <a:pt x="0" y="3"/>
+                  </a:lnTo>
+                  <a:close/>
+                </a:path>
+              </a:pathLst>
+            </a:custGeom>
+            <a:solidFill>
+              <a:schemeClr val="accent1">
+                <a:lumMod val="75000"/>
+              </a:schemeClr>
+            </a:solidFill>
+            <a:ln>
+              <a:noFill/>
+            </a:ln>
+          </p:spPr>
+        </p:sp>
+        <p:sp>
+          <p:nvSpPr>
+            <p:cNvPr id="19" name="Freeform 11">
+              <a:extLst>
+                <a:ext uri="{FF2B5EF4-FFF2-40B4-BE49-F238E27FC236}">
+                  <a16:creationId xmlns:a16="http://schemas.microsoft.com/office/drawing/2014/main" id="{EAB50995-FA10-4035-B16D-7D3989B2B62E}"/>
+                </a:ext>
+                <a:ext uri="{C183D7F6-B498-43B3-948B-1728B52AA6E4}">
+                  <adec:decorative xmlns:adec="http://schemas.microsoft.com/office/drawing/2017/decorative" val="1"/>
+                </a:ext>
+              </a:extLst>
+            </p:cNvPr>
+            <p:cNvSpPr/>
+            <p:nvPr>
+              <p:extLst>
+                <p:ext uri="{386F3935-93C4-4BCD-93E2-E3B085C9AB24}">
+                  <p16:designElem xmlns:p16="http://schemas.microsoft.com/office/powerpoint/2015/main" val="1"/>
+                </p:ext>
+              </p:extLst>
+            </p:nvPr>
+          </p:nvSpPr>
+          <p:spPr bwMode="auto">
+            <a:xfrm>
+              <a:off x="1320800" y="5238750"/>
+              <a:ext cx="1695450" cy="1619250"/>
+            </a:xfrm>
+            <a:custGeom>
+              <a:avLst/>
+              <a:gdLst/>
+              <a:ahLst/>
+              <a:cxnLst/>
+              <a:rect l="0" t="0" r="r" b="b"/>
+              <a:pathLst>
+                <a:path w="1068" h="1020">
+                  <a:moveTo>
+                    <a:pt x="1068" y="1020"/>
+                  </a:moveTo>
+                  <a:lnTo>
+                    <a:pt x="184" y="60"/>
+                  </a:lnTo>
+                  <a:lnTo>
+                    <a:pt x="154" y="27"/>
+                  </a:lnTo>
+                  <a:lnTo>
+                    <a:pt x="157" y="27"/>
+                  </a:lnTo>
+                  <a:lnTo>
+                    <a:pt x="157" y="24"/>
+                  </a:lnTo>
+                  <a:lnTo>
+                    <a:pt x="154" y="24"/>
+                  </a:lnTo>
+                  <a:lnTo>
+                    <a:pt x="0" y="0"/>
+                  </a:lnTo>
+                  <a:lnTo>
+                    <a:pt x="0" y="0"/>
+                  </a:lnTo>
+                  <a:lnTo>
+                    <a:pt x="774" y="1020"/>
+                  </a:lnTo>
+                  <a:lnTo>
+                    <a:pt x="1068" y="1020"/>
+                  </a:lnTo>
+                  <a:close/>
+                </a:path>
+              </a:pathLst>
+            </a:custGeom>
+            <a:solidFill>
+              <a:schemeClr val="tx1">
+                <a:lumMod val="75000"/>
+                <a:lumOff val="25000"/>
+              </a:schemeClr>
+            </a:solidFill>
+            <a:ln>
+              <a:noFill/>
+            </a:ln>
+          </p:spPr>
+        </p:sp>
+      </p:grpSp>
       <p:sp>
         <p:nvSpPr>
           <p:cNvPr id="2" name="Title 1">
@@ -15929,57 +16353,20 @@
           </p:nvPr>
         </p:nvSpPr>
         <p:spPr>
-          <a:effectLst/>
+          <a:xfrm>
+            <a:off x="1760706" y="685800"/>
+            <a:ext cx="9742318" cy="1752599"/>
+          </a:xfrm>
         </p:spPr>
         <p:txBody>
-          <a:bodyPr anchor="ctr">
+          <a:bodyPr vert="horz" lIns="91440" tIns="45720" rIns="91440" bIns="45720" rtlCol="0" anchor="ctr">
             <a:normAutofit/>
           </a:bodyPr>
           <a:lstStyle/>
           <a:p>
             <a:r>
-              <a:rPr lang="en-US" sz="3200" b="1" u="sng" dirty="0"/>
+              <a:rPr lang="en-US" b="1" u="sng"/>
               <a:t>User Management &amp; Runs Management</a:t>
-            </a:r>
-          </a:p>
-        </p:txBody>
-      </p:sp>
-      <p:sp>
-        <p:nvSpPr>
-          <p:cNvPr id="3" name="Content Placeholder 2">
-            <a:extLst>
-              <a:ext uri="{FF2B5EF4-FFF2-40B4-BE49-F238E27FC236}">
-                <a16:creationId xmlns:a16="http://schemas.microsoft.com/office/drawing/2014/main" id="{A6BC5341-A928-9BC4-FADF-88E3B7BCF038}"/>
-              </a:ext>
-            </a:extLst>
-          </p:cNvPr>
-          <p:cNvSpPr>
-            <a:spLocks noGrp="1"/>
-          </p:cNvSpPr>
-          <p:nvPr>
-            <p:ph sz="half" idx="1"/>
-          </p:nvPr>
-        </p:nvSpPr>
-        <p:spPr/>
-        <p:txBody>
-          <a:bodyPr anchor="ctr">
-            <a:normAutofit/>
-          </a:bodyPr>
-          <a:lstStyle/>
-          <a:p>
-            <a:pPr marL="0" indent="0">
-              <a:buNone/>
-            </a:pPr>
-            <a:r>
-              <a:rPr lang="en-US" sz="2000" dirty="0"/>
-              <a:t>Photo of the users list (of the admin actions)</a:t>
-            </a:r>
-            <a:br>
-              <a:rPr lang="en-US" sz="2000" dirty="0"/>
-            </a:br>
-            <a:r>
-              <a:rPr lang="en-US" sz="2000" dirty="0"/>
-              <a:t>…</a:t>
             </a:r>
           </a:p>
         </p:txBody>
@@ -16000,18 +16387,34 @@
             <p:ph sz="half" idx="2"/>
           </p:nvPr>
         </p:nvSpPr>
-        <p:spPr/>
+        <p:spPr>
+          <a:xfrm>
+            <a:off x="6470396" y="2885274"/>
+            <a:ext cx="5072483" cy="1080275"/>
+          </a:xfrm>
+        </p:spPr>
         <p:txBody>
           <a:bodyPr>
             <a:normAutofit/>
           </a:bodyPr>
           <a:lstStyle/>
           <a:p>
-            <a:pPr marL="0" indent="0">
+            <a:pPr marL="0" indent="0" defTabSz="333756">
+              <a:spcAft>
+                <a:spcPts val="438"/>
+              </a:spcAft>
               <a:buNone/>
             </a:pPr>
             <a:r>
-              <a:rPr lang="en-US" dirty="0"/>
+              <a:rPr lang="en-US" sz="2000" b="1" u="sng" kern="1200" cap="none" dirty="0">
+                <a:solidFill>
+                  <a:schemeClr val="tx1"/>
+                </a:solidFill>
+                <a:effectLst/>
+                <a:latin typeface="+mn-lt"/>
+                <a:ea typeface="+mn-ea"/>
+                <a:cs typeface="+mn-cs"/>
+              </a:rPr>
               <a:t>Photo of the tasks list (admin/regular user)</a:t>
             </a:r>
           </a:p>
@@ -16019,10 +16422,343 @@
             <a:pPr marL="0" indent="0">
               <a:buNone/>
             </a:pPr>
+            <a:endParaRPr lang="en-US" sz="3200" b="1" u="sng" dirty="0"/>
+          </a:p>
+        </p:txBody>
+      </p:sp>
+      <p:pic>
+        <p:nvPicPr>
+          <p:cNvPr id="6" name="Picture 5">
+            <a:extLst>
+              <a:ext uri="{FF2B5EF4-FFF2-40B4-BE49-F238E27FC236}">
+                <a16:creationId xmlns:a16="http://schemas.microsoft.com/office/drawing/2014/main" id="{8DD23DC5-A102-F799-854E-8892D2BAFC51}"/>
+              </a:ext>
+            </a:extLst>
+          </p:cNvPr>
+          <p:cNvPicPr>
+            <a:picLocks noChangeAspect="1"/>
+          </p:cNvPicPr>
+          <p:nvPr/>
+        </p:nvPicPr>
+        <p:blipFill>
+          <a:blip r:embed="rId2"/>
+          <a:stretch>
+            <a:fillRect/>
+          </a:stretch>
+        </p:blipFill>
+        <p:spPr>
+          <a:xfrm>
+            <a:off x="1379536" y="2502063"/>
+            <a:ext cx="5051005" cy="2357314"/>
+          </a:xfrm>
+          <a:prstGeom prst="rect">
+            <a:avLst/>
+          </a:prstGeom>
+        </p:spPr>
+      </p:pic>
+      <p:pic>
+        <p:nvPicPr>
+          <p:cNvPr id="8" name="Picture 7">
+            <a:extLst>
+              <a:ext uri="{FF2B5EF4-FFF2-40B4-BE49-F238E27FC236}">
+                <a16:creationId xmlns:a16="http://schemas.microsoft.com/office/drawing/2014/main" id="{348D0AC7-2BB8-DE62-05C3-B33AEABEE250}"/>
+              </a:ext>
+            </a:extLst>
+          </p:cNvPr>
+          <p:cNvPicPr>
+            <a:picLocks noChangeAspect="1"/>
+          </p:cNvPicPr>
+          <p:nvPr/>
+        </p:nvPicPr>
+        <p:blipFill>
+          <a:blip r:embed="rId3"/>
+          <a:stretch>
+            <a:fillRect/>
+          </a:stretch>
+        </p:blipFill>
+        <p:spPr>
+          <a:xfrm>
+            <a:off x="6368454" y="3429000"/>
+            <a:ext cx="5134570" cy="2303206"/>
+          </a:xfrm>
+          <a:prstGeom prst="rect">
+            <a:avLst/>
+          </a:prstGeom>
+        </p:spPr>
+      </p:pic>
+      <p:sp>
+        <p:nvSpPr>
+          <p:cNvPr id="11" name="Content Placeholder 3">
+            <a:extLst>
+              <a:ext uri="{FF2B5EF4-FFF2-40B4-BE49-F238E27FC236}">
+                <a16:creationId xmlns:a16="http://schemas.microsoft.com/office/drawing/2014/main" id="{7A87894A-F498-48A8-8CB5-DDB1E69532E2}"/>
+              </a:ext>
+            </a:extLst>
+          </p:cNvPr>
+          <p:cNvSpPr txBox="1">
+            <a:spLocks/>
+          </p:cNvSpPr>
+          <p:nvPr/>
+        </p:nvSpPr>
+        <p:spPr>
+          <a:xfrm>
+            <a:off x="1437767" y="1991447"/>
+            <a:ext cx="5072483" cy="1080275"/>
+          </a:xfrm>
+          <a:prstGeom prst="rect">
+            <a:avLst/>
+          </a:prstGeom>
+        </p:spPr>
+        <p:txBody>
+          <a:bodyPr vert="horz" lIns="91440" tIns="45720" rIns="91440" bIns="45720" rtlCol="0" anchor="ctr">
+            <a:normAutofit/>
+          </a:bodyPr>
+          <a:lstStyle>
+            <a:lvl1pPr marL="285750" indent="-285750" algn="l" defTabSz="457200" rtl="0" eaLnBrk="1" latinLnBrk="0" hangingPunct="1">
+              <a:spcBef>
+                <a:spcPct val="20000"/>
+              </a:spcBef>
+              <a:spcAft>
+                <a:spcPts val="600"/>
+              </a:spcAft>
+              <a:buClr>
+                <a:schemeClr val="accent1">
+                  <a:lumMod val="75000"/>
+                </a:schemeClr>
+              </a:buClr>
+              <a:buSzPct val="145000"/>
+              <a:buFont typeface="Arial"/>
+              <a:buChar char="•"/>
+              <a:defRPr sz="1800" kern="1200" cap="none">
+                <a:solidFill>
+                  <a:schemeClr val="tx1"/>
+                </a:solidFill>
+                <a:effectLst/>
+                <a:latin typeface="+mn-lt"/>
+                <a:ea typeface="+mn-ea"/>
+                <a:cs typeface="+mn-cs"/>
+              </a:defRPr>
+            </a:lvl1pPr>
+            <a:lvl2pPr marL="742950" indent="-285750" algn="l" defTabSz="457200" rtl="0" eaLnBrk="1" latinLnBrk="0" hangingPunct="1">
+              <a:spcBef>
+                <a:spcPct val="20000"/>
+              </a:spcBef>
+              <a:spcAft>
+                <a:spcPts val="600"/>
+              </a:spcAft>
+              <a:buClr>
+                <a:schemeClr val="accent1">
+                  <a:lumMod val="75000"/>
+                </a:schemeClr>
+              </a:buClr>
+              <a:buSzPct val="145000"/>
+              <a:buFont typeface="Arial"/>
+              <a:buChar char="•"/>
+              <a:defRPr sz="1600" kern="1200" cap="none">
+                <a:solidFill>
+                  <a:schemeClr val="tx1"/>
+                </a:solidFill>
+                <a:effectLst/>
+                <a:latin typeface="+mn-lt"/>
+                <a:ea typeface="+mn-ea"/>
+                <a:cs typeface="+mn-cs"/>
+              </a:defRPr>
+            </a:lvl2pPr>
+            <a:lvl3pPr marL="1200150" indent="-285750" algn="l" defTabSz="457200" rtl="0" eaLnBrk="1" latinLnBrk="0" hangingPunct="1">
+              <a:spcBef>
+                <a:spcPct val="20000"/>
+              </a:spcBef>
+              <a:spcAft>
+                <a:spcPts val="600"/>
+              </a:spcAft>
+              <a:buClr>
+                <a:schemeClr val="accent1">
+                  <a:lumMod val="75000"/>
+                </a:schemeClr>
+              </a:buClr>
+              <a:buSzPct val="145000"/>
+              <a:buFont typeface="Arial"/>
+              <a:buChar char="•"/>
+              <a:defRPr sz="1400" kern="1200" cap="none">
+                <a:solidFill>
+                  <a:schemeClr val="tx1"/>
+                </a:solidFill>
+                <a:effectLst/>
+                <a:latin typeface="+mn-lt"/>
+                <a:ea typeface="+mn-ea"/>
+                <a:cs typeface="+mn-cs"/>
+              </a:defRPr>
+            </a:lvl3pPr>
+            <a:lvl4pPr marL="1543050" indent="-171450" algn="l" defTabSz="457200" rtl="0" eaLnBrk="1" latinLnBrk="0" hangingPunct="1">
+              <a:spcBef>
+                <a:spcPct val="20000"/>
+              </a:spcBef>
+              <a:spcAft>
+                <a:spcPts val="600"/>
+              </a:spcAft>
+              <a:buClr>
+                <a:schemeClr val="accent1">
+                  <a:lumMod val="75000"/>
+                </a:schemeClr>
+              </a:buClr>
+              <a:buSzPct val="145000"/>
+              <a:buFont typeface="Arial"/>
+              <a:buChar char="•"/>
+              <a:defRPr sz="1200" kern="1200" cap="none">
+                <a:solidFill>
+                  <a:schemeClr val="tx1"/>
+                </a:solidFill>
+                <a:effectLst/>
+                <a:latin typeface="+mn-lt"/>
+                <a:ea typeface="+mn-ea"/>
+                <a:cs typeface="+mn-cs"/>
+              </a:defRPr>
+            </a:lvl4pPr>
+            <a:lvl5pPr marL="2000250" indent="-171450" algn="l" defTabSz="457200" rtl="0" eaLnBrk="1" latinLnBrk="0" hangingPunct="1">
+              <a:spcBef>
+                <a:spcPct val="20000"/>
+              </a:spcBef>
+              <a:spcAft>
+                <a:spcPts val="600"/>
+              </a:spcAft>
+              <a:buClr>
+                <a:schemeClr val="accent1">
+                  <a:lumMod val="75000"/>
+                </a:schemeClr>
+              </a:buClr>
+              <a:buSzPct val="145000"/>
+              <a:buFont typeface="Arial"/>
+              <a:buChar char="•"/>
+              <a:defRPr sz="1200" kern="1200" cap="none">
+                <a:solidFill>
+                  <a:schemeClr val="tx1"/>
+                </a:solidFill>
+                <a:effectLst/>
+                <a:latin typeface="+mn-lt"/>
+                <a:ea typeface="+mn-ea"/>
+                <a:cs typeface="+mn-cs"/>
+              </a:defRPr>
+            </a:lvl5pPr>
+            <a:lvl6pPr marL="2514600" indent="-228600" algn="l" defTabSz="457200" rtl="0" eaLnBrk="1" latinLnBrk="0" hangingPunct="1">
+              <a:spcBef>
+                <a:spcPct val="20000"/>
+              </a:spcBef>
+              <a:spcAft>
+                <a:spcPts val="600"/>
+              </a:spcAft>
+              <a:buClr>
+                <a:schemeClr val="accent1">
+                  <a:lumMod val="75000"/>
+                </a:schemeClr>
+              </a:buClr>
+              <a:buSzPct val="145000"/>
+              <a:buFont typeface="Arial"/>
+              <a:buChar char="•"/>
+              <a:defRPr sz="1200" kern="1200" cap="none">
+                <a:solidFill>
+                  <a:schemeClr val="tx1"/>
+                </a:solidFill>
+                <a:effectLst/>
+                <a:latin typeface="+mn-lt"/>
+                <a:ea typeface="+mn-ea"/>
+                <a:cs typeface="+mn-cs"/>
+              </a:defRPr>
+            </a:lvl6pPr>
+            <a:lvl7pPr marL="2971800" indent="-228600" algn="l" defTabSz="457200" rtl="0" eaLnBrk="1" latinLnBrk="0" hangingPunct="1">
+              <a:spcBef>
+                <a:spcPct val="20000"/>
+              </a:spcBef>
+              <a:spcAft>
+                <a:spcPts val="600"/>
+              </a:spcAft>
+              <a:buClr>
+                <a:schemeClr val="accent1">
+                  <a:lumMod val="75000"/>
+                </a:schemeClr>
+              </a:buClr>
+              <a:buSzPct val="145000"/>
+              <a:buFont typeface="Arial"/>
+              <a:buChar char="•"/>
+              <a:defRPr sz="1200" kern="1200" cap="none">
+                <a:solidFill>
+                  <a:schemeClr val="tx1"/>
+                </a:solidFill>
+                <a:effectLst/>
+                <a:latin typeface="+mn-lt"/>
+                <a:ea typeface="+mn-ea"/>
+                <a:cs typeface="+mn-cs"/>
+              </a:defRPr>
+            </a:lvl7pPr>
+            <a:lvl8pPr marL="3429000" indent="-228600" algn="l" defTabSz="457200" rtl="0" eaLnBrk="1" latinLnBrk="0" hangingPunct="1">
+              <a:spcBef>
+                <a:spcPct val="20000"/>
+              </a:spcBef>
+              <a:spcAft>
+                <a:spcPts val="600"/>
+              </a:spcAft>
+              <a:buClr>
+                <a:schemeClr val="accent1">
+                  <a:lumMod val="75000"/>
+                </a:schemeClr>
+              </a:buClr>
+              <a:buSzPct val="145000"/>
+              <a:buFont typeface="Arial"/>
+              <a:buChar char="•"/>
+              <a:defRPr sz="1200" kern="1200" cap="none">
+                <a:solidFill>
+                  <a:schemeClr val="tx1"/>
+                </a:solidFill>
+                <a:effectLst/>
+                <a:latin typeface="+mn-lt"/>
+                <a:ea typeface="+mn-ea"/>
+                <a:cs typeface="+mn-cs"/>
+              </a:defRPr>
+            </a:lvl8pPr>
+            <a:lvl9pPr marL="3886200" indent="-228600" algn="l" defTabSz="457200" rtl="0" eaLnBrk="1" latinLnBrk="0" hangingPunct="1">
+              <a:spcBef>
+                <a:spcPct val="20000"/>
+              </a:spcBef>
+              <a:spcAft>
+                <a:spcPts val="600"/>
+              </a:spcAft>
+              <a:buClr>
+                <a:schemeClr val="accent1">
+                  <a:lumMod val="75000"/>
+                </a:schemeClr>
+              </a:buClr>
+              <a:buSzPct val="145000"/>
+              <a:buFont typeface="Arial"/>
+              <a:buChar char="•"/>
+              <a:defRPr sz="1200" kern="1200" cap="none">
+                <a:solidFill>
+                  <a:schemeClr val="tx1"/>
+                </a:solidFill>
+                <a:effectLst/>
+                <a:latin typeface="+mn-lt"/>
+                <a:ea typeface="+mn-ea"/>
+                <a:cs typeface="+mn-cs"/>
+              </a:defRPr>
+            </a:lvl9pPr>
+          </a:lstStyle>
+          <a:p>
+            <a:pPr marL="0" indent="0" defTabSz="333756">
+              <a:spcAft>
+                <a:spcPts val="438"/>
+              </a:spcAft>
+              <a:buFont typeface="Arial"/>
+              <a:buNone/>
+            </a:pPr>
             <a:r>
-              <a:rPr lang="en-US" dirty="0"/>
-              <a:t>…</a:t>
+              <a:rPr lang="en-US" sz="2000" b="1" u="sng" dirty="0"/>
+              <a:t>Photo of the users list (for admin only)</a:t>
             </a:r>
+          </a:p>
+          <a:p>
+            <a:pPr marL="0" indent="0">
+              <a:buFont typeface="Arial"/>
+              <a:buNone/>
+            </a:pPr>
+            <a:endParaRPr lang="en-US" sz="3200" b="1" u="sng" dirty="0"/>
           </a:p>
         </p:txBody>
       </p:sp>

</xml_diff>

<commit_message>
Updated statistics & Docs
</commit_message>
<xml_diff>
--- a/Documents/SemesterB Marathon Presentation.pptx
+++ b/Documents/SemesterB Marathon Presentation.pptx
@@ -2733,8 +2733,8 @@
             <a:defRPr cap="all"/>
           </a:pPr>
           <a:r>
-            <a:rPr lang="en-US"/>
-            <a:t>All pages in the pages in the app are set and ready to use.</a:t>
+            <a:rPr lang="en-US" dirty="0"/>
+            <a:t>All pages in the app are set and ready to use.</a:t>
           </a:r>
         </a:p>
       </dgm:t>
@@ -3313,8 +3313,15 @@
             </a:lnSpc>
           </a:pPr>
           <a:r>
-            <a:rPr lang="en-US"/>
-            <a:t>Continue optimizing the algorithms.</a:t>
+            <a:rPr lang="en-US" dirty="0"/>
+            <a:t>Continue optimizing the algorithms</a:t>
+          </a:r>
+          <a:br>
+            <a:rPr lang="en-US" dirty="0"/>
+          </a:br>
+          <a:r>
+            <a:rPr lang="en-US" dirty="0"/>
+            <a:t>(Queue runs, improve code logic, etc.).</a:t>
           </a:r>
         </a:p>
       </dgm:t>
@@ -3402,15 +3409,19 @@
             </a:lnSpc>
           </a:pPr>
           <a:r>
-            <a:rPr lang="en-US"/>
+            <a:rPr lang="en-US" dirty="0"/>
             <a:t>Deploying to the BGU servers </a:t>
           </a:r>
           <a:br>
-            <a:rPr lang="en-US"/>
+            <a:rPr lang="en-US" dirty="0"/>
           </a:br>
           <a:r>
+            <a:rPr lang="en-US" dirty="0"/>
+            <a:t>(still waiting for a server from our client – from our </a:t>
+          </a:r>
+          <a:r>
             <a:rPr lang="en-US"/>
-            <a:t>(still waiting for a server from our client).</a:t>
+            <a:t>side everything is set &amp; ready).</a:t>
           </a:r>
         </a:p>
       </dgm:t>
@@ -3776,8 +3787,8 @@
             <a:defRPr cap="all"/>
           </a:pPr>
           <a:r>
-            <a:rPr lang="en-US" sz="1200" kern="1200"/>
-            <a:t>All pages in the pages in the app are set and ready to use.</a:t>
+            <a:rPr lang="en-US" sz="1200" kern="1200" dirty="0"/>
+            <a:t>All pages in the app are set and ready to use.</a:t>
           </a:r>
         </a:p>
       </dsp:txBody>
@@ -4568,8 +4579,15 @@
             <a:buNone/>
           </a:pPr>
           <a:r>
-            <a:rPr lang="en-US" sz="2100" kern="1200"/>
-            <a:t>Continue optimizing the algorithms.</a:t>
+            <a:rPr lang="en-US" sz="2100" kern="1200" dirty="0"/>
+            <a:t>Continue optimizing the algorithms</a:t>
+          </a:r>
+          <a:br>
+            <a:rPr lang="en-US" sz="2100" kern="1200" dirty="0"/>
+          </a:br>
+          <a:r>
+            <a:rPr lang="en-US" sz="2100" kern="1200" dirty="0"/>
+            <a:t>(Queue runs, improve code logic, etc.).</a:t>
           </a:r>
         </a:p>
       </dsp:txBody>
@@ -4891,15 +4909,19 @@
             <a:buNone/>
           </a:pPr>
           <a:r>
-            <a:rPr lang="en-US" sz="2100" kern="1200"/>
+            <a:rPr lang="en-US" sz="2100" kern="1200" dirty="0"/>
             <a:t>Deploying to the BGU servers </a:t>
           </a:r>
           <a:br>
-            <a:rPr lang="en-US" sz="2100" kern="1200"/>
+            <a:rPr lang="en-US" sz="2100" kern="1200" dirty="0"/>
           </a:br>
           <a:r>
+            <a:rPr lang="en-US" sz="2100" kern="1200" dirty="0"/>
+            <a:t>(still waiting for a server from our client – from our </a:t>
+          </a:r>
+          <a:r>
             <a:rPr lang="en-US" sz="2100" kern="1200"/>
-            <a:t>(still waiting for a server from our client).</a:t>
+            <a:t>side everything is set &amp; ready).</a:t>
           </a:r>
         </a:p>
       </dsp:txBody>
@@ -9240,7 +9262,7 @@
           <a:p>
             <a:fld id="{EFBA5EAA-4DAB-45C1-9CCB-89B72C47B331}" type="datetimeFigureOut">
               <a:rPr lang="en-US" smtClean="0"/>
-              <a:t>4/23/2023</a:t>
+              <a:t>4/30/2023</a:t>
             </a:fld>
             <a:endParaRPr lang="en-US"/>
           </a:p>
@@ -9536,7 +9558,7 @@
           <a:p>
             <a:fld id="{EFBA5EAA-4DAB-45C1-9CCB-89B72C47B331}" type="datetimeFigureOut">
               <a:rPr lang="en-US" smtClean="0"/>
-              <a:t>4/23/2023</a:t>
+              <a:t>4/30/2023</a:t>
             </a:fld>
             <a:endParaRPr lang="en-US"/>
           </a:p>
@@ -9784,7 +9806,7 @@
           <a:p>
             <a:fld id="{EFBA5EAA-4DAB-45C1-9CCB-89B72C47B331}" type="datetimeFigureOut">
               <a:rPr lang="en-US" smtClean="0"/>
-              <a:t>4/23/2023</a:t>
+              <a:t>4/30/2023</a:t>
             </a:fld>
             <a:endParaRPr lang="en-US"/>
           </a:p>
@@ -10324,7 +10346,7 @@
           <a:p>
             <a:fld id="{EFBA5EAA-4DAB-45C1-9CCB-89B72C47B331}" type="datetimeFigureOut">
               <a:rPr lang="en-US" smtClean="0"/>
-              <a:t>4/23/2023</a:t>
+              <a:t>4/30/2023</a:t>
             </a:fld>
             <a:endParaRPr lang="en-US"/>
           </a:p>
@@ -10572,7 +10594,7 @@
           <a:p>
             <a:fld id="{EFBA5EAA-4DAB-45C1-9CCB-89B72C47B331}" type="datetimeFigureOut">
               <a:rPr lang="en-US" smtClean="0"/>
-              <a:t>4/23/2023</a:t>
+              <a:t>4/30/2023</a:t>
             </a:fld>
             <a:endParaRPr lang="en-US"/>
           </a:p>
@@ -11104,7 +11126,7 @@
           <a:p>
             <a:fld id="{EFBA5EAA-4DAB-45C1-9CCB-89B72C47B331}" type="datetimeFigureOut">
               <a:rPr lang="en-US" smtClean="0"/>
-              <a:t>4/23/2023</a:t>
+              <a:t>4/30/2023</a:t>
             </a:fld>
             <a:endParaRPr lang="en-US"/>
           </a:p>
@@ -11401,7 +11423,7 @@
           <a:p>
             <a:fld id="{EFBA5EAA-4DAB-45C1-9CCB-89B72C47B331}" type="datetimeFigureOut">
               <a:rPr lang="en-US" smtClean="0"/>
-              <a:t>4/23/2023</a:t>
+              <a:t>4/30/2023</a:t>
             </a:fld>
             <a:endParaRPr lang="en-US"/>
           </a:p>
@@ -11575,7 +11597,7 @@
           <a:p>
             <a:fld id="{EFBA5EAA-4DAB-45C1-9CCB-89B72C47B331}" type="datetimeFigureOut">
               <a:rPr lang="en-US" smtClean="0"/>
-              <a:t>4/23/2023</a:t>
+              <a:t>4/30/2023</a:t>
             </a:fld>
             <a:endParaRPr lang="en-US"/>
           </a:p>
@@ -11755,7 +11777,7 @@
           <a:p>
             <a:fld id="{EFBA5EAA-4DAB-45C1-9CCB-89B72C47B331}" type="datetimeFigureOut">
               <a:rPr lang="en-US" smtClean="0"/>
-              <a:t>4/23/2023</a:t>
+              <a:t>4/30/2023</a:t>
             </a:fld>
             <a:endParaRPr lang="en-US"/>
           </a:p>
@@ -11925,7 +11947,7 @@
           <a:p>
             <a:fld id="{EFBA5EAA-4DAB-45C1-9CCB-89B72C47B331}" type="datetimeFigureOut">
               <a:rPr lang="en-US" smtClean="0"/>
-              <a:t>4/23/2023</a:t>
+              <a:t>4/30/2023</a:t>
             </a:fld>
             <a:endParaRPr lang="en-US"/>
           </a:p>
@@ -12176,7 +12198,7 @@
           <a:p>
             <a:fld id="{EFBA5EAA-4DAB-45C1-9CCB-89B72C47B331}" type="datetimeFigureOut">
               <a:rPr lang="en-US" smtClean="0"/>
-              <a:t>4/23/2023</a:t>
+              <a:t>4/30/2023</a:t>
             </a:fld>
             <a:endParaRPr lang="en-US"/>
           </a:p>
@@ -12473,7 +12495,7 @@
           <a:p>
             <a:fld id="{EFBA5EAA-4DAB-45C1-9CCB-89B72C47B331}" type="datetimeFigureOut">
               <a:rPr lang="en-US" smtClean="0"/>
-              <a:t>4/23/2023</a:t>
+              <a:t>4/30/2023</a:t>
             </a:fld>
             <a:endParaRPr lang="en-US"/>
           </a:p>
@@ -12915,7 +12937,7 @@
           <a:p>
             <a:fld id="{EFBA5EAA-4DAB-45C1-9CCB-89B72C47B331}" type="datetimeFigureOut">
               <a:rPr lang="en-US" smtClean="0"/>
-              <a:t>4/23/2023</a:t>
+              <a:t>4/30/2023</a:t>
             </a:fld>
             <a:endParaRPr lang="en-US"/>
           </a:p>
@@ -13033,7 +13055,7 @@
           <a:p>
             <a:fld id="{EFBA5EAA-4DAB-45C1-9CCB-89B72C47B331}" type="datetimeFigureOut">
               <a:rPr lang="en-US" smtClean="0"/>
-              <a:t>4/23/2023</a:t>
+              <a:t>4/30/2023</a:t>
             </a:fld>
             <a:endParaRPr lang="en-US"/>
           </a:p>
@@ -13128,7 +13150,7 @@
           <a:p>
             <a:fld id="{EFBA5EAA-4DAB-45C1-9CCB-89B72C47B331}" type="datetimeFigureOut">
               <a:rPr lang="en-US" smtClean="0"/>
-              <a:t>4/23/2023</a:t>
+              <a:t>4/30/2023</a:t>
             </a:fld>
             <a:endParaRPr lang="en-US"/>
           </a:p>
@@ -13411,7 +13433,7 @@
           <a:p>
             <a:fld id="{EFBA5EAA-4DAB-45C1-9CCB-89B72C47B331}" type="datetimeFigureOut">
               <a:rPr lang="en-US" smtClean="0"/>
-              <a:t>4/23/2023</a:t>
+              <a:t>4/30/2023</a:t>
             </a:fld>
             <a:endParaRPr lang="en-US"/>
           </a:p>
@@ -13702,7 +13724,7 @@
           <a:p>
             <a:fld id="{EFBA5EAA-4DAB-45C1-9CCB-89B72C47B331}" type="datetimeFigureOut">
               <a:rPr lang="en-US" smtClean="0"/>
-              <a:t>4/23/2023</a:t>
+              <a:t>4/30/2023</a:t>
             </a:fld>
             <a:endParaRPr lang="en-US"/>
           </a:p>
@@ -14232,7 +14254,7 @@
           <a:p>
             <a:fld id="{EFBA5EAA-4DAB-45C1-9CCB-89B72C47B331}" type="datetimeFigureOut">
               <a:rPr lang="en-US" smtClean="0"/>
-              <a:t>4/23/2023</a:t>
+              <a:t>4/30/2023</a:t>
             </a:fld>
             <a:endParaRPr lang="en-US"/>
           </a:p>
@@ -15846,7 +15868,7 @@
             <p:ph idx="1"/>
             <p:extLst>
               <p:ext uri="{D42A27DB-BD31-4B8C-83A1-F6EECF244321}">
-                <p14:modId xmlns:p14="http://schemas.microsoft.com/office/powerpoint/2010/main" val="424587640"/>
+                <p14:modId xmlns:p14="http://schemas.microsoft.com/office/powerpoint/2010/main" val="490323232"/>
               </p:ext>
             </p:extLst>
           </p:nvPr>
@@ -16875,22 +16897,17 @@
           </a:bodyPr>
           <a:lstStyle/>
           <a:p>
-            <a:r>
-              <a:rPr lang="en-US" sz="2000" dirty="0"/>
-              <a:t>(Showing a simple example from back to front)</a:t>
-            </a:r>
-          </a:p>
-          <a:p>
-            <a:r>
-              <a:rPr lang="en-US" sz="2000" dirty="0"/>
-              <a:t>(Explain about a complex example – such as running an algorithm, from back to front)</a:t>
-            </a:r>
-          </a:p>
-          <a:p>
-            <a:pPr marL="0" indent="0">
+            <a:pPr marL="0" indent="0" algn="ctr">
               <a:buNone/>
             </a:pPr>
-            <a:endParaRPr lang="en-US" sz="2000" dirty="0"/>
+            <a:r>
+              <a:rPr lang="en-US" sz="3600" dirty="0">
+                <a:solidFill>
+                  <a:srgbClr val="00B0F0"/>
+                </a:solidFill>
+              </a:rPr>
+              <a:t>(Full examples and explanations can be found in the demo-video of “iteration #2 submission”)</a:t>
+            </a:r>
           </a:p>
         </p:txBody>
       </p:sp>
@@ -17123,6 +17140,11 @@
           </p:cNvGraphicFramePr>
           <p:nvPr>
             <p:ph idx="1"/>
+            <p:extLst>
+              <p:ext uri="{D42A27DB-BD31-4B8C-83A1-F6EECF244321}">
+                <p14:modId xmlns:p14="http://schemas.microsoft.com/office/powerpoint/2010/main" val="1068984985"/>
+              </p:ext>
+            </p:extLst>
           </p:nvPr>
         </p:nvGraphicFramePr>
         <p:xfrm>

</xml_diff>